<commit_message>
pequena correção nos arquivos
</commit_message>
<xml_diff>
--- a/output/ebook - template.pptx
+++ b/output/ebook - template.pptx
@@ -223,7 +223,7 @@
           <a:p>
             <a:fld id="{23A45833-28E0-485F-94FB-227C905FC319}" type="datetimeFigureOut">
               <a:rPr lang="pt-BR" smtClean="0"/>
-              <a:t>07/01/2025</a:t>
+              <a:t>08/01/2025</a:t>
             </a:fld>
             <a:endParaRPr lang="pt-BR"/>
           </a:p>
@@ -621,7 +621,7 @@
           <a:p>
             <a:fld id="{209B77A0-7346-475C-AEE3-16E0613CA10B}" type="datetime1">
               <a:rPr lang="pt-BR" smtClean="0"/>
-              <a:t>07/01/2025</a:t>
+              <a:t>08/01/2025</a:t>
             </a:fld>
             <a:endParaRPr lang="pt-BR"/>
           </a:p>
@@ -794,7 +794,7 @@
           <a:p>
             <a:fld id="{DB7B7EDF-004F-4CBF-9063-E1C62B639B5F}" type="datetime1">
               <a:rPr lang="pt-BR" smtClean="0"/>
-              <a:t>07/01/2025</a:t>
+              <a:t>08/01/2025</a:t>
             </a:fld>
             <a:endParaRPr lang="pt-BR"/>
           </a:p>
@@ -977,7 +977,7 @@
           <a:p>
             <a:fld id="{303ED659-D553-40F4-95F6-580716508671}" type="datetime1">
               <a:rPr lang="pt-BR" smtClean="0"/>
-              <a:t>07/01/2025</a:t>
+              <a:t>08/01/2025</a:t>
             </a:fld>
             <a:endParaRPr lang="pt-BR"/>
           </a:p>
@@ -1150,7 +1150,7 @@
           <a:p>
             <a:fld id="{B9EFDBB6-0E7E-421E-A8F7-70D8FB6520DD}" type="datetime1">
               <a:rPr lang="pt-BR" smtClean="0"/>
-              <a:t>07/01/2025</a:t>
+              <a:t>08/01/2025</a:t>
             </a:fld>
             <a:endParaRPr lang="pt-BR"/>
           </a:p>
@@ -1397,7 +1397,7 @@
           <a:p>
             <a:fld id="{57C1D184-D9B9-4F8E-B21F-78C5AE5C367A}" type="datetime1">
               <a:rPr lang="pt-BR" smtClean="0"/>
-              <a:t>07/01/2025</a:t>
+              <a:t>08/01/2025</a:t>
             </a:fld>
             <a:endParaRPr lang="pt-BR"/>
           </a:p>
@@ -1632,7 +1632,7 @@
           <a:p>
             <a:fld id="{EDEB5512-2BB1-415D-81C5-033884623C49}" type="datetime1">
               <a:rPr lang="pt-BR" smtClean="0"/>
-              <a:t>07/01/2025</a:t>
+              <a:t>08/01/2025</a:t>
             </a:fld>
             <a:endParaRPr lang="pt-BR"/>
           </a:p>
@@ -2002,7 +2002,7 @@
           <a:p>
             <a:fld id="{8E90E722-C571-40DC-A440-A3849629E764}" type="datetime1">
               <a:rPr lang="pt-BR" smtClean="0"/>
-              <a:t>07/01/2025</a:t>
+              <a:t>08/01/2025</a:t>
             </a:fld>
             <a:endParaRPr lang="pt-BR"/>
           </a:p>
@@ -2123,7 +2123,7 @@
           <a:p>
             <a:fld id="{3D8D92A4-3BF7-4089-BDC5-D381C8A8F118}" type="datetime1">
               <a:rPr lang="pt-BR" smtClean="0"/>
-              <a:t>07/01/2025</a:t>
+              <a:t>08/01/2025</a:t>
             </a:fld>
             <a:endParaRPr lang="pt-BR"/>
           </a:p>
@@ -2221,7 +2221,7 @@
           <a:p>
             <a:fld id="{CEDEDD10-797B-4921-A019-D368448CD6A0}" type="datetime1">
               <a:rPr lang="pt-BR" smtClean="0"/>
-              <a:t>07/01/2025</a:t>
+              <a:t>08/01/2025</a:t>
             </a:fld>
             <a:endParaRPr lang="pt-BR"/>
           </a:p>
@@ -2501,7 +2501,7 @@
           <a:p>
             <a:fld id="{B10D1D17-0DC8-4C5A-99FF-D6C15B5966D5}" type="datetime1">
               <a:rPr lang="pt-BR" smtClean="0"/>
-              <a:t>07/01/2025</a:t>
+              <a:t>08/01/2025</a:t>
             </a:fld>
             <a:endParaRPr lang="pt-BR"/>
           </a:p>
@@ -2761,7 +2761,7 @@
           <a:p>
             <a:fld id="{40CD278A-D1E3-400A-8E91-84845D25DB35}" type="datetime1">
               <a:rPr lang="pt-BR" smtClean="0"/>
-              <a:t>07/01/2025</a:t>
+              <a:t>08/01/2025</a:t>
             </a:fld>
             <a:endParaRPr lang="pt-BR"/>
           </a:p>
@@ -2977,7 +2977,7 @@
           <a:p>
             <a:fld id="{6C4D8217-B025-4D4D-9270-DB92E6ADAD9E}" type="datetime1">
               <a:rPr lang="pt-BR" smtClean="0"/>
-              <a:t>07/01/2025</a:t>
+              <a:t>08/01/2025</a:t>
             </a:fld>
             <a:endParaRPr lang="pt-BR"/>
           </a:p>
@@ -4133,7 +4133,7 @@
         <p:spPr>
           <a:xfrm>
             <a:off x="-11152" y="0"/>
-            <a:ext cx="9601200" cy="12801600"/>
+            <a:ext cx="9612352" cy="12801600"/>
           </a:xfrm>
           <a:prstGeom prst="rect">
             <a:avLst/>
@@ -4802,7 +4802,7 @@
         <p:spPr>
           <a:xfrm>
             <a:off x="-11152" y="0"/>
-            <a:ext cx="9601200" cy="12801600"/>
+            <a:ext cx="9612352" cy="12801600"/>
           </a:xfrm>
           <a:prstGeom prst="rect">
             <a:avLst/>
@@ -5466,7 +5466,7 @@
         <p:spPr>
           <a:xfrm>
             <a:off x="-11152" y="0"/>
-            <a:ext cx="9601200" cy="12801600"/>
+            <a:ext cx="9612352" cy="12801600"/>
           </a:xfrm>
           <a:prstGeom prst="rect">
             <a:avLst/>
@@ -5705,6 +5705,35 @@
           <a:chExt cx="0" cy="0"/>
         </a:xfrm>
       </p:grpSpPr>
+      <p:pic>
+        <p:nvPicPr>
+          <p:cNvPr id="15" name="Imagem 14">
+            <a:extLst>
+              <a:ext uri="{FF2B5EF4-FFF2-40B4-BE49-F238E27FC236}">
+                <a16:creationId xmlns:a16="http://schemas.microsoft.com/office/drawing/2014/main" id="{AEF839CB-74B8-81BE-F1E9-44AF744AAA29}"/>
+              </a:ext>
+            </a:extLst>
+          </p:cNvPr>
+          <p:cNvPicPr>
+            <a:picLocks noChangeAspect="1"/>
+          </p:cNvPicPr>
+          <p:nvPr/>
+        </p:nvPicPr>
+        <p:blipFill rotWithShape="1">
+          <a:blip r:embed="rId2"/>
+          <a:srcRect t="67083"/>
+          <a:stretch/>
+        </p:blipFill>
+        <p:spPr>
+          <a:xfrm>
+            <a:off x="2116555" y="8765781"/>
+            <a:ext cx="5368089" cy="1375850"/>
+          </a:xfrm>
+          <a:prstGeom prst="rect">
+            <a:avLst/>
+          </a:prstGeom>
+        </p:spPr>
+      </p:pic>
       <p:sp>
         <p:nvSpPr>
           <p:cNvPr id="7" name="texto_componente">
@@ -5960,7 +5989,7 @@
           <p:nvPr/>
         </p:nvPicPr>
         <p:blipFill>
-          <a:blip r:embed="rId2">
+          <a:blip r:embed="rId3">
             <a:duotone>
               <a:schemeClr val="bg2">
                 <a:shade val="45000"/>
@@ -6014,7 +6043,7 @@
           <p:nvPr/>
         </p:nvPicPr>
         <p:blipFill>
-          <a:blip r:embed="rId3">
+          <a:blip r:embed="rId4">
             <a:extLst>
               <a:ext uri="{28A0092B-C50C-407E-A947-70E740481C1C}">
                 <a14:useLocalDpi xmlns:a14="http://schemas.microsoft.com/office/drawing/2010/main" val="0"/>
@@ -6049,7 +6078,7 @@
       <p:sp>
         <p:nvSpPr>
           <p:cNvPr id="8" name="texto_componente">
-            <a:hlinkClick r:id="rId4"/>
+            <a:hlinkClick r:id="rId5"/>
             <a:extLst>
               <a:ext uri="{FF2B5EF4-FFF2-40B4-BE49-F238E27FC236}">
                 <a16:creationId xmlns:a16="http://schemas.microsoft.com/office/drawing/2014/main" id="{34A3029A-E89E-D142-FAD8-AFAE7DB5D855}"/>
@@ -6077,42 +6106,15 @@
           <a:p>
             <a:pPr algn="just"/>
             <a:r>
-              <a:rPr lang="pt-BR" sz="2000" dirty="0"/>
+              <a:rPr lang="pt-BR" sz="2000" dirty="0">
+                <a:hlinkClick r:id="rId5"/>
+              </a:rPr>
               <a:t>https://github.com/rafaelsouzapinto/prompts-recipe-to-create-a-ebook</a:t>
             </a:r>
-          </a:p>
-        </p:txBody>
-      </p:sp>
-      <p:pic>
-        <p:nvPicPr>
-          <p:cNvPr id="15" name="Imagem 14">
-            <a:extLst>
-              <a:ext uri="{FF2B5EF4-FFF2-40B4-BE49-F238E27FC236}">
-                <a16:creationId xmlns:a16="http://schemas.microsoft.com/office/drawing/2014/main" id="{AEF839CB-74B8-81BE-F1E9-44AF744AAA29}"/>
-              </a:ext>
-            </a:extLst>
-          </p:cNvPr>
-          <p:cNvPicPr>
-            <a:picLocks noChangeAspect="1"/>
-          </p:cNvPicPr>
-          <p:nvPr/>
-        </p:nvPicPr>
-        <p:blipFill>
-          <a:blip r:embed="rId5"/>
-          <a:stretch>
-            <a:fillRect/>
-          </a:stretch>
-        </p:blipFill>
-        <p:spPr>
-          <a:xfrm>
-            <a:off x="943159" y="4669631"/>
-            <a:ext cx="7756356" cy="6039300"/>
-          </a:xfrm>
-          <a:prstGeom prst="rect">
-            <a:avLst/>
-          </a:prstGeom>
-        </p:spPr>
-      </p:pic>
+            <a:endParaRPr lang="pt-BR" sz="2000" dirty="0"/>
+          </a:p>
+        </p:txBody>
+      </p:sp>
     </p:spTree>
     <p:extLst>
       <p:ext uri="{BB962C8B-B14F-4D97-AF65-F5344CB8AC3E}">
@@ -6558,7 +6560,7 @@
         <p:spPr>
           <a:xfrm>
             <a:off x="-11152" y="0"/>
-            <a:ext cx="9601200" cy="12801600"/>
+            <a:ext cx="9612352" cy="12801600"/>
           </a:xfrm>
           <a:prstGeom prst="rect">
             <a:avLst/>
@@ -7221,7 +7223,7 @@
         <p:spPr>
           <a:xfrm>
             <a:off x="-11152" y="0"/>
-            <a:ext cx="9601200" cy="12801600"/>
+            <a:ext cx="9612352" cy="12801600"/>
           </a:xfrm>
           <a:prstGeom prst="rect">
             <a:avLst/>
@@ -7881,7 +7883,7 @@
         <p:spPr>
           <a:xfrm>
             <a:off x="-11152" y="0"/>
-            <a:ext cx="9601200" cy="12801600"/>
+            <a:ext cx="9612352" cy="12801600"/>
           </a:xfrm>
           <a:prstGeom prst="rect">
             <a:avLst/>
@@ -8560,7 +8562,7 @@
         <p:spPr>
           <a:xfrm>
             <a:off x="-11152" y="0"/>
-            <a:ext cx="9601200" cy="12801600"/>
+            <a:ext cx="9612352" cy="12801600"/>
           </a:xfrm>
           <a:prstGeom prst="rect">
             <a:avLst/>

</xml_diff>